<commit_message>
Corrected a few Typos on Student Research Posters
</commit_message>
<xml_diff>
--- a/PresentationPoster_NVR.pptx
+++ b/PresentationPoster_NVR.pptx
@@ -256,7 +256,7 @@
             <a:fld id="{0158C5BC-9A70-462C-B28D-9600239EAC64}" type="datetimeFigureOut">
               <a:rPr lang="en-US" smtClean="0"/>
               <a:pPr/>
-              <a:t>3/23/24</a:t>
+              <a:t>4/29/24</a:t>
             </a:fld>
             <a:endParaRPr lang="en-US"/>
           </a:p>
@@ -423,7 +423,7 @@
             <a:fld id="{E6CC2317-6751-4CD4-9995-8782DD78E936}" type="datetimeFigureOut">
               <a:rPr lang="en-US" smtClean="0"/>
               <a:pPr/>
-              <a:t>3/23/24</a:t>
+              <a:t>4/29/24</a:t>
             </a:fld>
             <a:endParaRPr lang="en-US" dirty="0"/>
           </a:p>
@@ -10596,7 +10596,7 @@
                 <a:latin typeface="Arial" panose="020B0604020202020204" pitchFamily="34" charset="0"/>
                 <a:cs typeface="Arial" panose="020B0604020202020204" pitchFamily="34" charset="0"/>
               </a:rPr>
-              <a:t>For the model, the validation data that was selected was the most recent year in the dataset (the 2022-203 NFL Season). </a:t>
+              <a:t>For the model, the validation data that was selected was the most recent year in the dataset (the 2022-2023 NFL Season). </a:t>
             </a:r>
           </a:p>
           <a:p>
@@ -10865,21 +10865,21 @@
                 <a:latin typeface="Arial" panose="020B0604020202020204" pitchFamily="34" charset="0"/>
                 <a:cs typeface="Arial" panose="020B0604020202020204" pitchFamily="34" charset="0"/>
               </a:rPr>
-              <a:t>Future work for this project could </a:t>
-            </a:r>
-            <a:r>
-              <a:rPr lang="en-US" dirty="0" err="1">
+              <a:t>Future work for this project </a:t>
+            </a:r>
+            <a:r>
+              <a:rPr lang="en-US">
                 <a:latin typeface="Arial" panose="020B0604020202020204" pitchFamily="34" charset="0"/>
                 <a:cs typeface="Arial" panose="020B0604020202020204" pitchFamily="34" charset="0"/>
               </a:rPr>
-              <a:t>inslude</a:t>
+              <a:t>could include </a:t>
             </a:r>
             <a:r>
               <a:rPr lang="en-US" dirty="0">
                 <a:latin typeface="Arial" panose="020B0604020202020204" pitchFamily="34" charset="0"/>
                 <a:cs typeface="Arial" panose="020B0604020202020204" pitchFamily="34" charset="0"/>
               </a:rPr>
-              <a:t> trying different ranges for the number of games that are included in the rolling averages of the team statistics, similar to that of the optimal number of neighbors. Perhaps other models need to be taken into consideration like Support Vector Machines.</a:t>
+              <a:t>trying different ranges for the number of games that are included in the rolling averages of the team statistics, similar to that of the optimal number of neighbors. Perhaps other models need to be taken into consideration like Support Vector Machines.</a:t>
             </a:r>
           </a:p>
           <a:p>

</xml_diff>